<commit_message>
ajout d'un exemple plus détaillé sur le cas 1 segur
</commit_message>
<xml_diff>
--- a/docs/pages/use-cases/segur/focus-json.pptx
+++ b/docs/pages/use-cases/segur/focus-json.pptx
@@ -6,6 +6,7 @@
   </p:sldMasterIdLst>
   <p:sldIdLst>
     <p:sldId id="256" r:id="rId2"/>
+    <p:sldId id="257" r:id="rId3"/>
   </p:sldIdLst>
   <p:sldSz cx="12192000" cy="6858000"/>
   <p:notesSz cx="6858000" cy="9144000"/>
@@ -104,6 +105,11 @@
       </a:defRPr>
     </a:lvl9pPr>
   </p:defaultTextStyle>
+  <p:extLst>
+    <p:ext uri="{EFAFB233-063F-42B5-8137-9DF3F51BA10A}">
+      <p15:sldGuideLst xmlns:p15="http://schemas.microsoft.com/office/powerpoint/2012/main"/>
+    </p:ext>
+  </p:extLst>
 </p:presentation>
 </file>
 
@@ -3323,6 +3329,305 @@
       </p:grpSpPr>
       <p:pic>
         <p:nvPicPr>
+          <p:cNvPr id="3" name="Image 2">
+            <a:extLst>
+              <a:ext uri="{FF2B5EF4-FFF2-40B4-BE49-F238E27FC236}">
+                <a16:creationId xmlns:a16="http://schemas.microsoft.com/office/drawing/2014/main" id="{EB6C8FCD-55EE-4DB3-CE4B-D624FF100C4A}"/>
+              </a:ext>
+            </a:extLst>
+          </p:cNvPr>
+          <p:cNvPicPr>
+            <a:picLocks noChangeAspect="1"/>
+          </p:cNvPicPr>
+          <p:nvPr/>
+        </p:nvPicPr>
+        <p:blipFill>
+          <a:blip r:embed="rId2"/>
+          <a:stretch>
+            <a:fillRect/>
+          </a:stretch>
+        </p:blipFill>
+        <p:spPr>
+          <a:xfrm>
+            <a:off x="1749834" y="397933"/>
+            <a:ext cx="8599197" cy="5946475"/>
+          </a:xfrm>
+          <a:prstGeom prst="rect">
+            <a:avLst/>
+          </a:prstGeom>
+        </p:spPr>
+      </p:pic>
+      <p:sp>
+        <p:nvSpPr>
+          <p:cNvPr id="6" name="Rectangle 5">
+            <a:extLst>
+              <a:ext uri="{FF2B5EF4-FFF2-40B4-BE49-F238E27FC236}">
+                <a16:creationId xmlns:a16="http://schemas.microsoft.com/office/drawing/2014/main" id="{B8740370-8C67-8CF0-B947-F5264904C82E}"/>
+              </a:ext>
+            </a:extLst>
+          </p:cNvPr>
+          <p:cNvSpPr/>
+          <p:nvPr/>
+        </p:nvSpPr>
+        <p:spPr>
+          <a:xfrm>
+            <a:off x="3562150" y="4389667"/>
+            <a:ext cx="6737790" cy="385233"/>
+          </a:xfrm>
+          <a:prstGeom prst="rect">
+            <a:avLst/>
+          </a:prstGeom>
+          <a:noFill/>
+          <a:ln>
+            <a:solidFill>
+              <a:schemeClr val="accent6">
+                <a:lumMod val="60000"/>
+                <a:lumOff val="40000"/>
+              </a:schemeClr>
+            </a:solidFill>
+          </a:ln>
+        </p:spPr>
+        <p:style>
+          <a:lnRef idx="2">
+            <a:schemeClr val="accent1">
+              <a:shade val="50000"/>
+            </a:schemeClr>
+          </a:lnRef>
+          <a:fillRef idx="1">
+            <a:schemeClr val="accent1"/>
+          </a:fillRef>
+          <a:effectRef idx="0">
+            <a:schemeClr val="accent1"/>
+          </a:effectRef>
+          <a:fontRef idx="minor">
+            <a:schemeClr val="lt1"/>
+          </a:fontRef>
+        </p:style>
+        <p:txBody>
+          <a:bodyPr rtlCol="0" anchor="ctr"/>
+          <a:lstStyle/>
+          <a:p>
+            <a:pPr algn="ctr"/>
+            <a:endParaRPr lang="fr-FR"/>
+          </a:p>
+        </p:txBody>
+      </p:sp>
+      <p:sp>
+        <p:nvSpPr>
+          <p:cNvPr id="8" name="Rectangle 7">
+            <a:extLst>
+              <a:ext uri="{FF2B5EF4-FFF2-40B4-BE49-F238E27FC236}">
+                <a16:creationId xmlns:a16="http://schemas.microsoft.com/office/drawing/2014/main" id="{60C261E5-457A-5DF2-E1EB-AC1C891CC7D0}"/>
+              </a:ext>
+            </a:extLst>
+          </p:cNvPr>
+          <p:cNvSpPr/>
+          <p:nvPr/>
+        </p:nvSpPr>
+        <p:spPr>
+          <a:xfrm>
+            <a:off x="3166533" y="3244850"/>
+            <a:ext cx="2521150" cy="283633"/>
+          </a:xfrm>
+          <a:prstGeom prst="rect">
+            <a:avLst/>
+          </a:prstGeom>
+          <a:noFill/>
+          <a:ln>
+            <a:solidFill>
+              <a:schemeClr val="accent4">
+                <a:lumMod val="20000"/>
+                <a:lumOff val="80000"/>
+              </a:schemeClr>
+            </a:solidFill>
+          </a:ln>
+        </p:spPr>
+        <p:style>
+          <a:lnRef idx="2">
+            <a:schemeClr val="accent1">
+              <a:shade val="50000"/>
+            </a:schemeClr>
+          </a:lnRef>
+          <a:fillRef idx="1">
+            <a:schemeClr val="accent1"/>
+          </a:fillRef>
+          <a:effectRef idx="0">
+            <a:schemeClr val="accent1"/>
+          </a:effectRef>
+          <a:fontRef idx="minor">
+            <a:schemeClr val="lt1"/>
+          </a:fontRef>
+        </p:style>
+        <p:txBody>
+          <a:bodyPr rtlCol="0" anchor="ctr"/>
+          <a:lstStyle/>
+          <a:p>
+            <a:pPr algn="ctr"/>
+            <a:endParaRPr lang="fr-FR"/>
+          </a:p>
+        </p:txBody>
+      </p:sp>
+      <p:sp>
+        <p:nvSpPr>
+          <p:cNvPr id="11" name="Ellipse 10">
+            <a:extLst>
+              <a:ext uri="{FF2B5EF4-FFF2-40B4-BE49-F238E27FC236}">
+                <a16:creationId xmlns:a16="http://schemas.microsoft.com/office/drawing/2014/main" id="{90E10907-83F2-FF2B-EFF0-83ACE7B4488A}"/>
+              </a:ext>
+            </a:extLst>
+          </p:cNvPr>
+          <p:cNvSpPr/>
+          <p:nvPr/>
+        </p:nvSpPr>
+        <p:spPr>
+          <a:xfrm>
+            <a:off x="5642514" y="3064934"/>
+            <a:ext cx="215900" cy="194733"/>
+          </a:xfrm>
+          <a:prstGeom prst="ellipse">
+            <a:avLst/>
+          </a:prstGeom>
+        </p:spPr>
+        <p:style>
+          <a:lnRef idx="3">
+            <a:schemeClr val="lt1"/>
+          </a:lnRef>
+          <a:fillRef idx="1">
+            <a:schemeClr val="accent3"/>
+          </a:fillRef>
+          <a:effectRef idx="1">
+            <a:schemeClr val="accent3"/>
+          </a:effectRef>
+          <a:fontRef idx="minor">
+            <a:schemeClr val="lt1"/>
+          </a:fontRef>
+        </p:style>
+        <p:txBody>
+          <a:bodyPr rtlCol="0" anchor="ctr"/>
+          <a:lstStyle/>
+          <a:p>
+            <a:pPr algn="ctr"/>
+            <a:r>
+              <a:rPr lang="fr-FR" sz="1100" dirty="0"/>
+              <a:t>1</a:t>
+            </a:r>
+          </a:p>
+        </p:txBody>
+      </p:sp>
+      <p:sp>
+        <p:nvSpPr>
+          <p:cNvPr id="12" name="Ellipse 11">
+            <a:extLst>
+              <a:ext uri="{FF2B5EF4-FFF2-40B4-BE49-F238E27FC236}">
+                <a16:creationId xmlns:a16="http://schemas.microsoft.com/office/drawing/2014/main" id="{56581B17-A4EF-41EC-AB04-D80BA1ED33E4}"/>
+              </a:ext>
+            </a:extLst>
+          </p:cNvPr>
+          <p:cNvSpPr/>
+          <p:nvPr/>
+        </p:nvSpPr>
+        <p:spPr>
+          <a:xfrm>
+            <a:off x="10000636" y="4194934"/>
+            <a:ext cx="215900" cy="194733"/>
+          </a:xfrm>
+          <a:prstGeom prst="ellipse">
+            <a:avLst/>
+          </a:prstGeom>
+        </p:spPr>
+        <p:style>
+          <a:lnRef idx="3">
+            <a:schemeClr val="lt1"/>
+          </a:lnRef>
+          <a:fillRef idx="1">
+            <a:schemeClr val="accent3"/>
+          </a:fillRef>
+          <a:effectRef idx="1">
+            <a:schemeClr val="accent3"/>
+          </a:effectRef>
+          <a:fontRef idx="minor">
+            <a:schemeClr val="lt1"/>
+          </a:fontRef>
+        </p:style>
+        <p:txBody>
+          <a:bodyPr rtlCol="0" anchor="ctr"/>
+          <a:lstStyle/>
+          <a:p>
+            <a:pPr algn="ctr"/>
+            <a:r>
+              <a:rPr lang="fr-FR" sz="1100" dirty="0"/>
+              <a:t>2</a:t>
+            </a:r>
+          </a:p>
+        </p:txBody>
+      </p:sp>
+      <p:sp>
+        <p:nvSpPr>
+          <p:cNvPr id="13" name="ZoneTexte 12">
+            <a:extLst>
+              <a:ext uri="{FF2B5EF4-FFF2-40B4-BE49-F238E27FC236}">
+                <a16:creationId xmlns:a16="http://schemas.microsoft.com/office/drawing/2014/main" id="{C8831F69-2156-3FB5-DF09-2A3F5471B2EA}"/>
+              </a:ext>
+            </a:extLst>
+          </p:cNvPr>
+          <p:cNvSpPr txBox="1"/>
+          <p:nvPr/>
+        </p:nvSpPr>
+        <p:spPr>
+          <a:xfrm>
+            <a:off x="2236380" y="28601"/>
+            <a:ext cx="1614545" cy="369332"/>
+          </a:xfrm>
+          <a:prstGeom prst="rect">
+            <a:avLst/>
+          </a:prstGeom>
+          <a:noFill/>
+        </p:spPr>
+        <p:txBody>
+          <a:bodyPr wrap="none" rtlCol="0">
+            <a:spAutoFit/>
+          </a:bodyPr>
+          <a:lstStyle/>
+          <a:p>
+            <a:r>
+              <a:rPr lang="fr-FR" dirty="0"/>
+              <a:t>Couloir Ségur 1</a:t>
+            </a:r>
+          </a:p>
+        </p:txBody>
+      </p:sp>
+    </p:spTree>
+    <p:extLst>
+      <p:ext uri="{BB962C8B-B14F-4D97-AF65-F5344CB8AC3E}">
+        <p14:creationId xmlns:p14="http://schemas.microsoft.com/office/powerpoint/2010/main" val="2721615211"/>
+      </p:ext>
+    </p:extLst>
+  </p:cSld>
+  <p:clrMapOvr>
+    <a:masterClrMapping/>
+  </p:clrMapOvr>
+</p:sld>
+</file>
+
+<file path=ppt/slides/slide2.xml><?xml version="1.0" encoding="utf-8"?>
+<p:sld xmlns:a="http://schemas.openxmlformats.org/drawingml/2006/main" xmlns:r="http://schemas.openxmlformats.org/officeDocument/2006/relationships" xmlns:p="http://schemas.openxmlformats.org/presentationml/2006/main">
+  <p:cSld>
+    <p:spTree>
+      <p:nvGrpSpPr>
+        <p:cNvPr id="1" name=""/>
+        <p:cNvGrpSpPr/>
+        <p:nvPr/>
+      </p:nvGrpSpPr>
+      <p:grpSpPr>
+        <a:xfrm>
+          <a:off x="0" y="0"/>
+          <a:ext cx="0" cy="0"/>
+          <a:chOff x="0" y="0"/>
+          <a:chExt cx="0" cy="0"/>
+        </a:xfrm>
+      </p:grpSpPr>
+      <p:pic>
+        <p:nvPicPr>
           <p:cNvPr id="5" name="Image 4">
             <a:extLst>
               <a:ext uri="{FF2B5EF4-FFF2-40B4-BE49-F238E27FC236}">
@@ -3693,7 +3998,7 @@
     </p:spTree>
     <p:extLst>
       <p:ext uri="{BB962C8B-B14F-4D97-AF65-F5344CB8AC3E}">
-        <p14:creationId xmlns:p14="http://schemas.microsoft.com/office/powerpoint/2010/main" val="2721615211"/>
+        <p14:creationId xmlns:p14="http://schemas.microsoft.com/office/powerpoint/2010/main" val="2765283169"/>
       </p:ext>
     </p:extLst>
   </p:cSld>

</xml_diff>